<commit_message>
[prg1] cv8 notes and presentations
</commit_message>
<xml_diff>
--- a/data/2018-19/prg1/cv8/prg1_cv8.pptx
+++ b/data/2018-19/prg1/cv8/prg1_cv8.pptx
@@ -108,6 +108,11 @@
       </a:defRPr>
     </a:lvl9pPr>
   </p:defaultTextStyle>
+  <p:extLst>
+    <p:ext uri="{EFAFB233-063F-42B5-8137-9DF3F51BA10A}">
+      <p15:sldGuideLst xmlns:p15="http://schemas.microsoft.com/office/powerpoint/2012/main"/>
+    </p:ext>
+  </p:extLst>
 </p:presentation>
 </file>
 
@@ -7727,8 +7732,8 @@
           <a:lstStyle/>
           <a:p>
             <a:r>
-              <a:rPr lang="cs-CZ" dirty="0" err="1" smtClean="0"/>
-              <a:t>Record</a:t>
+              <a:rPr lang="cs-CZ" dirty="0" smtClean="0"/>
+              <a:t>Záznam</a:t>
             </a:r>
             <a:endParaRPr lang="cs-CZ" dirty="0"/>
           </a:p>
@@ -7963,6 +7968,13 @@
             </a:pPr>
             <a:r>
               <a:rPr lang="en-US" dirty="0" smtClean="0"/>
+              <a:t>type</a:t>
+            </a:r>
+            <a:br>
+              <a:rPr lang="en-US" dirty="0" smtClean="0"/>
+            </a:br>
+            <a:r>
+              <a:rPr lang="en-US" dirty="0" smtClean="0"/>
               <a:t>record-</a:t>
             </a:r>
             <a:r>
@@ -7975,7 +7987,11 @@
             </a:r>
             <a:r>
               <a:rPr lang="en-US" dirty="0"/>
-              <a:t>= ^ record-name</a:t>
+              <a:t>= </a:t>
+            </a:r>
+            <a:r>
+              <a:rPr lang="en-US" b="1" dirty="0" smtClean="0"/>
+              <a:t>^record-name</a:t>
             </a:r>
             <a:r>
               <a:rPr lang="en-US" dirty="0" smtClean="0"/>
@@ -8107,7 +8123,15 @@
             </a:r>
             <a:r>
               <a:rPr lang="en-US" dirty="0" smtClean="0"/>
-              <a:t> : ^integer;</a:t>
+              <a:t> : </a:t>
+            </a:r>
+            <a:r>
+              <a:rPr lang="en-US" b="1" dirty="0" smtClean="0"/>
+              <a:t>^integer</a:t>
+            </a:r>
+            <a:r>
+              <a:rPr lang="en-US" dirty="0" smtClean="0"/>
+              <a:t>;</a:t>
             </a:r>
             <a:br>
               <a:rPr lang="en-US" dirty="0" smtClean="0"/>
@@ -8121,7 +8145,15 @@
             </a:br>
             <a:r>
               <a:rPr lang="en-US" dirty="0" smtClean="0"/>
-              <a:t>new(r1); new(r2);</a:t>
+              <a:t>new(r1); </a:t>
+            </a:r>
+            <a:r>
+              <a:rPr lang="en-US" b="1" dirty="0" smtClean="0"/>
+              <a:t>new(r2)</a:t>
+            </a:r>
+            <a:r>
+              <a:rPr lang="en-US" dirty="0" smtClean="0"/>
+              <a:t>;</a:t>
             </a:r>
             <a:br>
               <a:rPr lang="en-US" dirty="0" smtClean="0"/>
@@ -8147,11 +8179,19 @@
             </a:r>
             <a:r>
               <a:rPr lang="en-US" dirty="0" smtClean="0"/>
-              <a:t>value1; r1</a:t>
+              <a:t>value1; </a:t>
+            </a:r>
+            <a:r>
+              <a:rPr lang="en-US" b="1" dirty="0" smtClean="0"/>
+              <a:t>r1</a:t>
+            </a:r>
+            <a:r>
+              <a:rPr lang="en-US" b="1" dirty="0"/>
+              <a:t>^</a:t>
             </a:r>
             <a:r>
               <a:rPr lang="en-US" dirty="0"/>
-              <a:t>^.</a:t>
+              <a:t>.</a:t>
             </a:r>
             <a:r>
               <a:rPr lang="en-US" dirty="0" smtClean="0"/>
@@ -8169,20 +8209,44 @@
               <a:rPr lang="en-US" dirty="0" smtClean="0"/>
             </a:br>
             <a:r>
+              <a:rPr lang="en-US" b="1" dirty="0" err="1" smtClean="0"/>
+              <a:t>integer_ptr</a:t>
+            </a:r>
+            <a:r>
+              <a:rPr lang="en-US" b="1" dirty="0" smtClean="0"/>
+              <a:t>^ </a:t>
+            </a:r>
+            <a:r>
+              <a:rPr lang="en-US" dirty="0" smtClean="0"/>
+              <a:t>:= 5; </a:t>
+            </a:r>
+            <a:r>
               <a:rPr lang="en-US" dirty="0" err="1" smtClean="0"/>
               <a:t>integer_ptr</a:t>
             </a:r>
             <a:r>
               <a:rPr lang="en-US" dirty="0" smtClean="0"/>
-              <a:t>^ := 5; </a:t>
-            </a:r>
-            <a:r>
-              <a:rPr lang="en-US" dirty="0" err="1" smtClean="0"/>
-              <a:t>integer_ptr</a:t>
+              <a:t> </a:t>
             </a:r>
             <a:r>
               <a:rPr lang="en-US" dirty="0" smtClean="0"/>
-              <a:t>^ := NIL; r1^ := r2^;</a:t>
+              <a:t>:= </a:t>
+            </a:r>
+            <a:r>
+              <a:rPr lang="en-US" b="1" dirty="0" smtClean="0"/>
+              <a:t>NIL</a:t>
+            </a:r>
+            <a:r>
+              <a:rPr lang="en-US" dirty="0" smtClean="0"/>
+              <a:t>; r1^ := </a:t>
+            </a:r>
+            <a:r>
+              <a:rPr lang="en-US" smtClean="0"/>
+              <a:t>r2</a:t>
+            </a:r>
+            <a:r>
+              <a:rPr lang="en-US" smtClean="0"/>
+              <a:t>^; r1 := r2;</a:t>
             </a:r>
             <a:r>
               <a:rPr lang="en-US" dirty="0"/>
@@ -8200,11 +8264,19 @@
             </a:br>
             <a:r>
               <a:rPr lang="en-US" dirty="0" smtClean="0"/>
-              <a:t>dispose(r1); dispose(r2</a:t>
+              <a:t>dispose(r1); </a:t>
+            </a:r>
+            <a:r>
+              <a:rPr lang="en-US" b="1" dirty="0" smtClean="0"/>
+              <a:t>dispose(r2</a:t>
+            </a:r>
+            <a:r>
+              <a:rPr lang="en-US" b="1" dirty="0"/>
+              <a:t>)</a:t>
             </a:r>
             <a:r>
               <a:rPr lang="en-US" dirty="0"/>
-              <a:t>);</a:t>
+              <a:t>;</a:t>
             </a:r>
             <a:endParaRPr lang="en-US" dirty="0" smtClean="0"/>
           </a:p>
@@ -8486,7 +8558,11 @@
             </a:pPr>
             <a:r>
               <a:rPr lang="cs-CZ" dirty="0" smtClean="0"/>
-              <a:t>Dynamické seznam záznamů</a:t>
+              <a:t>Dynamický </a:t>
+            </a:r>
+            <a:r>
+              <a:rPr lang="cs-CZ" dirty="0" smtClean="0"/>
+              <a:t>seznam záznamů</a:t>
             </a:r>
           </a:p>
           <a:p>
@@ -8521,14 +8597,9 @@
               <a:t>P</a:t>
             </a:r>
             <a:r>
-              <a:rPr lang="cs-CZ" dirty="0" err="1" smtClean="0"/>
-              <a:t>řidávat</a:t>
-            </a:r>
-            <a:r>
-              <a:rPr lang="cs-CZ" smtClean="0"/>
-              <a:t>, odebírat z daného místa</a:t>
-            </a:r>
-            <a:endParaRPr lang="cs-CZ" dirty="0" smtClean="0"/>
+              <a:rPr lang="cs-CZ" dirty="0" smtClean="0"/>
+              <a:t>řidávat, odebírat z daného místa</a:t>
+            </a:r>
           </a:p>
           <a:p>
             <a:pPr lvl="1">

</xml_diff>